<commit_message>
docs: changed slides in pptx
</commit_message>
<xml_diff>
--- a/Diseño de la interfaz gráfica.pptx
+++ b/Diseño de la interfaz gráfica.pptx
@@ -17,7 +17,6 @@
     <p:sldId id="262" r:id="rId12"/>
     <p:sldId id="263" r:id="rId13"/>
     <p:sldId id="264" r:id="rId14"/>
-    <p:sldId id="265" r:id="rId15"/>
   </p:sldIdLst>
   <p:sldSz cy="5143500" cx="9144000"/>
   <p:notesSz cx="6858000" cy="9144000"/>
@@ -750,105 +749,6 @@
       <p:sp>
         <p:nvSpPr>
           <p:cNvPr id="52" name="Google Shape;52;p:notes"/>
-          <p:cNvSpPr txBox="1"/>
-          <p:nvPr>
-            <p:ph idx="1" type="body"/>
-          </p:nvPr>
-        </p:nvSpPr>
-        <p:spPr>
-          <a:xfrm>
-            <a:off x="685800" y="4343400"/>
-            <a:ext cx="5486400" cy="4114800"/>
-          </a:xfrm>
-          <a:prstGeom prst="rect">
-            <a:avLst/>
-          </a:prstGeom>
-        </p:spPr>
-        <p:txBody>
-          <a:bodyPr anchorCtr="0" anchor="t" bIns="91425" lIns="91425" spcFirstLastPara="1" rIns="91425" wrap="square" tIns="91425">
-            <a:noAutofit/>
-          </a:bodyPr>
-          <a:lstStyle/>
-          <a:p>
-            <a:pPr indent="0" lvl="0" marL="0" rtl="0" algn="l">
-              <a:spcBef>
-                <a:spcPts val="0"/>
-              </a:spcBef>
-              <a:spcAft>
-                <a:spcPts val="0"/>
-              </a:spcAft>
-              <a:buNone/>
-            </a:pPr>
-            <a:r>
-              <a:t/>
-            </a:r>
-            <a:endParaRPr/>
-          </a:p>
-        </p:txBody>
-      </p:sp>
-    </p:spTree>
-  </p:cSld>
-  <p:clrMapOvr>
-    <a:masterClrMapping/>
-  </p:clrMapOvr>
-</p:notes>
-</file>
-
-<file path=ppt/notesSlides/notesSlide10.xml><?xml version="1.0" encoding="utf-8"?>
-<p:notes xmlns:a="http://schemas.openxmlformats.org/drawingml/2006/main" xmlns:r="http://schemas.openxmlformats.org/officeDocument/2006/relationships" xmlns:mc="http://schemas.openxmlformats.org/markup-compatibility/2006" xmlns:mv="urn:schemas-microsoft-com:mac:vml" xmlns:p="http://schemas.openxmlformats.org/presentationml/2006/main" xmlns:c="http://schemas.openxmlformats.org/drawingml/2006/chart" xmlns:dgm="http://schemas.openxmlformats.org/drawingml/2006/diagram" xmlns:o="urn:schemas-microsoft-com:office:office" xmlns:v="urn:schemas-microsoft-com:vml" xmlns:pvml="urn:schemas-microsoft-com:office:powerpoint" xmlns:com="http://schemas.openxmlformats.org/drawingml/2006/compatibility" xmlns:p14="http://schemas.microsoft.com/office/powerpoint/2010/main" xmlns:p15="http://schemas.microsoft.com/office/powerpoint/2012/main" xmlns:ahyp="http://schemas.microsoft.com/office/drawing/2018/hyperlinkcolor" showMasterPhAnim="0" showMasterSp="0">
-  <p:cSld>
-    <p:spTree>
-      <p:nvGrpSpPr>
-        <p:cNvPr id="161" name="Shape 161"/>
-        <p:cNvGrpSpPr/>
-        <p:nvPr/>
-      </p:nvGrpSpPr>
-      <p:grpSpPr>
-        <a:xfrm>
-          <a:off x="0" y="0"/>
-          <a:ext cx="0" cy="0"/>
-          <a:chOff x="0" y="0"/>
-          <a:chExt cx="0" cy="0"/>
-        </a:xfrm>
-      </p:grpSpPr>
-      <p:sp>
-        <p:nvSpPr>
-          <p:cNvPr id="162" name="Google Shape;162;g215a5d13246_7_4:notes"/>
-          <p:cNvSpPr/>
-          <p:nvPr>
-            <p:ph idx="2" type="sldImg"/>
-          </p:nvPr>
-        </p:nvSpPr>
-        <p:spPr>
-          <a:xfrm>
-            <a:off x="381300" y="685800"/>
-            <a:ext cx="6096000" cy="3429000"/>
-          </a:xfrm>
-          <a:custGeom>
-            <a:rect b="b" l="l" r="r" t="t"/>
-            <a:pathLst>
-              <a:path extrusionOk="0" h="120000" w="120000">
-                <a:moveTo>
-                  <a:pt x="0" y="0"/>
-                </a:moveTo>
-                <a:lnTo>
-                  <a:pt x="120000" y="0"/>
-                </a:lnTo>
-                <a:lnTo>
-                  <a:pt x="120000" y="120000"/>
-                </a:lnTo>
-                <a:lnTo>
-                  <a:pt x="0" y="120000"/>
-                </a:lnTo>
-                <a:close/>
-              </a:path>
-            </a:pathLst>
-          </a:custGeom>
-        </p:spPr>
-      </p:sp>
-      <p:sp>
-        <p:nvSpPr>
-          <p:cNvPr id="163" name="Google Shape;163;g215a5d13246_7_4:notes"/>
           <p:cNvSpPr txBox="1"/>
           <p:nvPr>
             <p:ph idx="1" type="body"/>
@@ -6748,109 +6648,6 @@
 </p:sld>
 </file>
 
-<file path=ppt/slides/slide10.xml><?xml version="1.0" encoding="utf-8"?>
-<p:sld xmlns:a="http://schemas.openxmlformats.org/drawingml/2006/main" xmlns:r="http://schemas.openxmlformats.org/officeDocument/2006/relationships" xmlns:mc="http://schemas.openxmlformats.org/markup-compatibility/2006" xmlns:mv="urn:schemas-microsoft-com:mac:vml" xmlns:p="http://schemas.openxmlformats.org/presentationml/2006/main" xmlns:c="http://schemas.openxmlformats.org/drawingml/2006/chart" xmlns:dgm="http://schemas.openxmlformats.org/drawingml/2006/diagram" xmlns:o="urn:schemas-microsoft-com:office:office" xmlns:v="urn:schemas-microsoft-com:vml" xmlns:pvml="urn:schemas-microsoft-com:office:powerpoint" xmlns:com="http://schemas.openxmlformats.org/drawingml/2006/compatibility" xmlns:p14="http://schemas.microsoft.com/office/powerpoint/2010/main" xmlns:p15="http://schemas.microsoft.com/office/powerpoint/2012/main" xmlns:ahyp="http://schemas.microsoft.com/office/drawing/2018/hyperlinkcolor">
-  <p:cSld>
-    <p:spTree>
-      <p:nvGrpSpPr>
-        <p:cNvPr id="164" name="Shape 164"/>
-        <p:cNvGrpSpPr/>
-        <p:nvPr/>
-      </p:nvGrpSpPr>
-      <p:grpSpPr>
-        <a:xfrm>
-          <a:off x="0" y="0"/>
-          <a:ext cx="0" cy="0"/>
-          <a:chOff x="0" y="0"/>
-          <a:chExt cx="0" cy="0"/>
-        </a:xfrm>
-      </p:grpSpPr>
-      <p:sp>
-        <p:nvSpPr>
-          <p:cNvPr id="165" name="Google Shape;165;p22"/>
-          <p:cNvSpPr txBox="1"/>
-          <p:nvPr>
-            <p:ph type="title"/>
-          </p:nvPr>
-        </p:nvSpPr>
-        <p:spPr>
-          <a:xfrm>
-            <a:off x="311700" y="445025"/>
-            <a:ext cx="8520600" cy="572700"/>
-          </a:xfrm>
-          <a:prstGeom prst="rect">
-            <a:avLst/>
-          </a:prstGeom>
-        </p:spPr>
-        <p:txBody>
-          <a:bodyPr anchorCtr="0" anchor="t" bIns="91425" lIns="91425" spcFirstLastPara="1" rIns="91425" wrap="square" tIns="91425">
-            <a:normAutofit fontScale="90000"/>
-          </a:bodyPr>
-          <a:lstStyle/>
-          <a:p>
-            <a:pPr indent="0" lvl="0" marL="0" rtl="0" algn="l">
-              <a:spcBef>
-                <a:spcPts val="0"/>
-              </a:spcBef>
-              <a:spcAft>
-                <a:spcPts val="0"/>
-              </a:spcAft>
-              <a:buNone/>
-            </a:pPr>
-            <a:r>
-              <a:t/>
-            </a:r>
-            <a:endParaRPr/>
-          </a:p>
-        </p:txBody>
-      </p:sp>
-      <p:sp>
-        <p:nvSpPr>
-          <p:cNvPr id="166" name="Google Shape;166;p22"/>
-          <p:cNvSpPr txBox="1"/>
-          <p:nvPr>
-            <p:ph idx="1" type="body"/>
-          </p:nvPr>
-        </p:nvSpPr>
-        <p:spPr>
-          <a:xfrm>
-            <a:off x="311700" y="1152475"/>
-            <a:ext cx="8520600" cy="3416400"/>
-          </a:xfrm>
-          <a:prstGeom prst="rect">
-            <a:avLst/>
-          </a:prstGeom>
-        </p:spPr>
-        <p:txBody>
-          <a:bodyPr anchorCtr="0" anchor="t" bIns="91425" lIns="91425" spcFirstLastPara="1" rIns="91425" wrap="square" tIns="91425">
-            <a:normAutofit/>
-          </a:bodyPr>
-          <a:lstStyle/>
-          <a:p>
-            <a:pPr indent="0" lvl="0" marL="0" rtl="0" algn="l">
-              <a:spcBef>
-                <a:spcPts val="0"/>
-              </a:spcBef>
-              <a:spcAft>
-                <a:spcPts val="1200"/>
-              </a:spcAft>
-              <a:buNone/>
-            </a:pPr>
-            <a:r>
-              <a:t/>
-            </a:r>
-            <a:endParaRPr/>
-          </a:p>
-        </p:txBody>
-      </p:sp>
-    </p:spTree>
-  </p:cSld>
-  <p:clrMapOvr>
-    <a:masterClrMapping/>
-  </p:clrMapOvr>
-</p:sld>
-</file>
-
 <file path=ppt/slides/slide2.xml><?xml version="1.0" encoding="utf-8"?>
 <p:sld xmlns:a="http://schemas.openxmlformats.org/drawingml/2006/main" xmlns:r="http://schemas.openxmlformats.org/officeDocument/2006/relationships" xmlns:mc="http://schemas.openxmlformats.org/markup-compatibility/2006" xmlns:mv="urn:schemas-microsoft-com:mac:vml" xmlns:p="http://schemas.openxmlformats.org/presentationml/2006/main" xmlns:c="http://schemas.openxmlformats.org/drawingml/2006/chart" xmlns:dgm="http://schemas.openxmlformats.org/drawingml/2006/diagram" xmlns:o="urn:schemas-microsoft-com:office:office" xmlns:v="urn:schemas-microsoft-com:vml" xmlns:pvml="urn:schemas-microsoft-com:office:powerpoint" xmlns:com="http://schemas.openxmlformats.org/drawingml/2006/compatibility" xmlns:p14="http://schemas.microsoft.com/office/powerpoint/2010/main" xmlns:p15="http://schemas.microsoft.com/office/powerpoint/2012/main" xmlns:ahyp="http://schemas.microsoft.com/office/drawing/2018/hyperlinkcolor">
   <p:cSld>
@@ -6968,7 +6765,7 @@
         <p:spPr>
           <a:xfrm>
             <a:off x="782375" y="1100875"/>
-            <a:ext cx="7617600" cy="2808900"/>
+            <a:ext cx="7617600" cy="3038700"/>
           </a:xfrm>
           <a:prstGeom prst="rect">
             <a:avLst/>
@@ -7016,8 +6813,8 @@
         </p:nvSpPr>
         <p:spPr>
           <a:xfrm>
-            <a:off x="782325" y="3909775"/>
-            <a:ext cx="7617600" cy="827400"/>
+            <a:off x="782325" y="4139575"/>
+            <a:ext cx="7617600" cy="597600"/>
           </a:xfrm>
           <a:prstGeom prst="rect">
             <a:avLst/>
@@ -7109,7 +6906,7 @@
         <p:spPr>
           <a:xfrm>
             <a:off x="1228775" y="1342425"/>
-            <a:ext cx="6752700" cy="2246400"/>
+            <a:ext cx="6752700" cy="2520000"/>
           </a:xfrm>
           <a:prstGeom prst="rect">
             <a:avLst/>
@@ -10365,8 +10162,8 @@
         </p:blipFill>
         <p:spPr>
           <a:xfrm>
-            <a:off x="1012563" y="704800"/>
-            <a:ext cx="7255779" cy="4312774"/>
+            <a:off x="1399425" y="609550"/>
+            <a:ext cx="6463525" cy="4401049"/>
           </a:xfrm>
           <a:prstGeom prst="rect">
             <a:avLst/>

</xml_diff>